<commit_message>
Downgraded ProjectFiles -> 4.6.1
</commit_message>
<xml_diff>
--- a/Fehlerbehandung und Debugging.pptx
+++ b/Fehlerbehandung und Debugging.pptx
@@ -12909,8 +12909,8 @@
         </p:blipFill>
         <p:spPr>
           <a:xfrm>
-            <a:off x="4932040" y="3104105"/>
-            <a:ext cx="3168774" cy="1604831"/>
+            <a:off x="4895067" y="3145532"/>
+            <a:ext cx="3737499" cy="1892863"/>
           </a:xfrm>
           <a:prstGeom prst="rect">
             <a:avLst/>
@@ -14154,7 +14154,7 @@
         <p:spPr>
           <a:xfrm>
             <a:off x="395873" y="3577580"/>
-            <a:ext cx="6215543" cy="785937"/>
+            <a:ext cx="8542074" cy="1080120"/>
           </a:xfrm>
           <a:prstGeom prst="rect">
             <a:avLst/>
@@ -19034,6 +19034,13 @@
       </p:transition>
     </mc:Fallback>
   </mc:AlternateContent>
+  <p:timing>
+    <p:tnLst>
+      <p:par>
+        <p:cTn id="1" dur="indefinite" restart="never" nodeType="tmRoot"/>
+      </p:par>
+    </p:tnLst>
+  </p:timing>
 </p:sld>
 </file>
 
@@ -19375,11 +19382,7 @@
             <a:pPr lvl="1"/>
             <a:r>
               <a:rPr lang="de-DE" dirty="0" smtClean="0"/>
-              <a:t>Logische </a:t>
-            </a:r>
-            <a:r>
-              <a:rPr lang="de-DE" dirty="0" smtClean="0"/>
-              <a:t>Fehler / Codeänderungen…</a:t>
+              <a:t>Logische Fehler / Codeänderungen…</a:t>
             </a:r>
           </a:p>
           <a:p>
@@ -19388,7 +19391,6 @@
               <a:rPr lang="de-DE" dirty="0" smtClean="0"/>
               <a:t>Unit Tests </a:t>
             </a:r>
-            <a:endParaRPr lang="de-DE" dirty="0" smtClean="0"/>
           </a:p>
           <a:p>
             <a:pPr lvl="1"/>
@@ -19396,7 +19398,6 @@
               <a:rPr lang="de-DE" dirty="0" smtClean="0"/>
               <a:t>Benutzereingaben validieren</a:t>
             </a:r>
-            <a:endParaRPr lang="de-DE" dirty="0" smtClean="0"/>
           </a:p>
           <a:p>
             <a:pPr lvl="1"/>
@@ -19413,7 +19414,6 @@
               <a:rPr lang="de-DE" dirty="0" smtClean="0"/>
               <a:t>Unerwartete Fehler</a:t>
             </a:r>
-            <a:endParaRPr lang="de-DE" dirty="0" smtClean="0"/>
           </a:p>
           <a:p>
             <a:pPr lvl="1"/>
@@ -19837,6 +19837,13 @@
       </p:transition>
     </mc:Fallback>
   </mc:AlternateContent>
+  <p:timing>
+    <p:tnLst>
+      <p:par>
+        <p:cTn id="1" dur="indefinite" restart="never" nodeType="tmRoot"/>
+      </p:par>
+    </p:tnLst>
+  </p:timing>
 </p:sld>
 </file>
 

</xml_diff>